<commit_message>
Add material for demo
</commit_message>
<xml_diff>
--- a/Demo1/Christmas_Demo_PPT.pptx
+++ b/Demo1/Christmas_Demo_PPT.pptx
@@ -120,7 +120,7 @@
 <file path=ppt/revisionInfo.xml><?xml version="1.0" encoding="utf-8"?>
 <p1510:revInfo xmlns:a="http://schemas.openxmlformats.org/drawingml/2006/main" xmlns:r="http://schemas.openxmlformats.org/officeDocument/2006/relationships" xmlns:p1510="http://schemas.microsoft.com/office/powerpoint/2015/10/main">
   <p1510:revLst>
-    <p1510:client id="{E0173219-27A4-4C2B-8E9F-5C3D7B7BFC25}" v="96" dt="2021-12-20T00:00:20.811"/>
+    <p1510:client id="{E0173219-27A4-4C2B-8E9F-5C3D7B7BFC25}" v="202" dt="2021-12-20T13:45:53.217"/>
   </p1510:revLst>
 </p1510:revInfo>
 </file>
@@ -130,7 +130,7 @@
   <pc:docChgLst>
     <pc:chgData name="SIMON" userId="57eaa06a-09bc-4c31-91e8-c21407715321" providerId="ADAL" clId="{E0173219-27A4-4C2B-8E9F-5C3D7B7BFC25}"/>
     <pc:docChg chg="undo custSel addSld modSld">
-      <pc:chgData name="SIMON" userId="57eaa06a-09bc-4c31-91e8-c21407715321" providerId="ADAL" clId="{E0173219-27A4-4C2B-8E9F-5C3D7B7BFC25}" dt="2021-12-20T00:00:20.811" v="1238"/>
+      <pc:chgData name="SIMON" userId="57eaa06a-09bc-4c31-91e8-c21407715321" providerId="ADAL" clId="{E0173219-27A4-4C2B-8E9F-5C3D7B7BFC25}" dt="2021-12-20T14:34:22.752" v="1429" actId="14100"/>
       <pc:docMkLst>
         <pc:docMk/>
       </pc:docMkLst>
@@ -214,7 +214,7 @@
         </pc:cxnChg>
       </pc:sldChg>
       <pc:sldChg chg="addSp modSp mod setBg">
-        <pc:chgData name="SIMON" userId="57eaa06a-09bc-4c31-91e8-c21407715321" providerId="ADAL" clId="{E0173219-27A4-4C2B-8E9F-5C3D7B7BFC25}" dt="2021-12-19T22:51:58.960" v="787" actId="20577"/>
+        <pc:chgData name="SIMON" userId="57eaa06a-09bc-4c31-91e8-c21407715321" providerId="ADAL" clId="{E0173219-27A4-4C2B-8E9F-5C3D7B7BFC25}" dt="2021-12-20T14:34:22.752" v="1429" actId="14100"/>
         <pc:sldMkLst>
           <pc:docMk/>
           <pc:sldMk cId="3299098916" sldId="257"/>
@@ -228,7 +228,7 @@
           </ac:spMkLst>
         </pc:spChg>
         <pc:spChg chg="mod">
-          <ac:chgData name="SIMON" userId="57eaa06a-09bc-4c31-91e8-c21407715321" providerId="ADAL" clId="{E0173219-27A4-4C2B-8E9F-5C3D7B7BFC25}" dt="2021-12-19T22:51:58.960" v="787" actId="20577"/>
+          <ac:chgData name="SIMON" userId="57eaa06a-09bc-4c31-91e8-c21407715321" providerId="ADAL" clId="{E0173219-27A4-4C2B-8E9F-5C3D7B7BFC25}" dt="2021-12-20T11:03:48.358" v="1239" actId="20577"/>
           <ac:spMkLst>
             <pc:docMk/>
             <pc:sldMk cId="3299098916" sldId="257"/>
@@ -249,6 +249,14 @@
             <pc:docMk/>
             <pc:sldMk cId="3299098916" sldId="257"/>
             <ac:picMk id="4" creationId="{0B3C7C70-EA1B-4CA2-B445-015D08E0975A}"/>
+          </ac:picMkLst>
+        </pc:picChg>
+        <pc:picChg chg="add mod">
+          <ac:chgData name="SIMON" userId="57eaa06a-09bc-4c31-91e8-c21407715321" providerId="ADAL" clId="{E0173219-27A4-4C2B-8E9F-5C3D7B7BFC25}" dt="2021-12-20T14:34:22.752" v="1429" actId="14100"/>
+          <ac:picMkLst>
+            <pc:docMk/>
+            <pc:sldMk cId="3299098916" sldId="257"/>
+            <ac:picMk id="6" creationId="{99D49BE6-8518-4B48-B263-3F123FE3C6DB}"/>
           </ac:picMkLst>
         </pc:picChg>
         <pc:cxnChg chg="add">
@@ -396,7 +404,7 @@
         </pc:cxnChg>
       </pc:sldChg>
       <pc:sldChg chg="addSp delSp modSp new mod setBg">
-        <pc:chgData name="SIMON" userId="57eaa06a-09bc-4c31-91e8-c21407715321" providerId="ADAL" clId="{E0173219-27A4-4C2B-8E9F-5C3D7B7BFC25}" dt="2021-12-19T23:18:57.329" v="917" actId="1076"/>
+        <pc:chgData name="SIMON" userId="57eaa06a-09bc-4c31-91e8-c21407715321" providerId="ADAL" clId="{E0173219-27A4-4C2B-8E9F-5C3D7B7BFC25}" dt="2021-12-20T13:30:58.539" v="1323" actId="1076"/>
         <pc:sldMkLst>
           <pc:docMk/>
           <pc:sldMk cId="3891945666" sldId="259"/>
@@ -418,7 +426,7 @@
           </ac:spMkLst>
         </pc:spChg>
         <pc:spChg chg="add mod ord">
-          <ac:chgData name="SIMON" userId="57eaa06a-09bc-4c31-91e8-c21407715321" providerId="ADAL" clId="{E0173219-27A4-4C2B-8E9F-5C3D7B7BFC25}" dt="2021-12-19T23:18:57.329" v="917" actId="1076"/>
+          <ac:chgData name="SIMON" userId="57eaa06a-09bc-4c31-91e8-c21407715321" providerId="ADAL" clId="{E0173219-27A4-4C2B-8E9F-5C3D7B7BFC25}" dt="2021-12-20T13:30:22.289" v="1318" actId="1076"/>
           <ac:spMkLst>
             <pc:docMk/>
             <pc:sldMk cId="3891945666" sldId="259"/>
@@ -434,7 +442,15 @@
           </ac:spMkLst>
         </pc:spChg>
         <pc:picChg chg="add mod">
-          <ac:chgData name="SIMON" userId="57eaa06a-09bc-4c31-91e8-c21407715321" providerId="ADAL" clId="{E0173219-27A4-4C2B-8E9F-5C3D7B7BFC25}" dt="2021-12-19T23:18:57.329" v="917" actId="1076"/>
+          <ac:chgData name="SIMON" userId="57eaa06a-09bc-4c31-91e8-c21407715321" providerId="ADAL" clId="{E0173219-27A4-4C2B-8E9F-5C3D7B7BFC25}" dt="2021-12-20T13:30:58.539" v="1323" actId="1076"/>
+          <ac:picMkLst>
+            <pc:docMk/>
+            <pc:sldMk cId="3891945666" sldId="259"/>
+            <ac:picMk id="4" creationId="{9B844152-376D-4222-9A2A-BD1B2A3A0814}"/>
+          </ac:picMkLst>
+        </pc:picChg>
+        <pc:picChg chg="add del mod">
+          <ac:chgData name="SIMON" userId="57eaa06a-09bc-4c31-91e8-c21407715321" providerId="ADAL" clId="{E0173219-27A4-4C2B-8E9F-5C3D7B7BFC25}" dt="2021-12-20T13:30:09.948" v="1316" actId="478"/>
           <ac:picMkLst>
             <pc:docMk/>
             <pc:sldMk cId="3891945666" sldId="259"/>
@@ -443,7 +459,7 @@
         </pc:picChg>
       </pc:sldChg>
       <pc:sldChg chg="addSp delSp modSp new mod setBg">
-        <pc:chgData name="SIMON" userId="57eaa06a-09bc-4c31-91e8-c21407715321" providerId="ADAL" clId="{E0173219-27A4-4C2B-8E9F-5C3D7B7BFC25}" dt="2021-12-19T23:13:59.524" v="902" actId="14100"/>
+        <pc:chgData name="SIMON" userId="57eaa06a-09bc-4c31-91e8-c21407715321" providerId="ADAL" clId="{E0173219-27A4-4C2B-8E9F-5C3D7B7BFC25}" dt="2021-12-20T13:25:48.736" v="1315" actId="26606"/>
         <pc:sldMkLst>
           <pc:docMk/>
           <pc:sldMk cId="2200142015" sldId="260"/>
@@ -457,31 +473,47 @@
           </ac:spMkLst>
         </pc:spChg>
         <pc:spChg chg="mod">
-          <ac:chgData name="SIMON" userId="57eaa06a-09bc-4c31-91e8-c21407715321" providerId="ADAL" clId="{E0173219-27A4-4C2B-8E9F-5C3D7B7BFC25}" dt="2021-12-19T23:13:50.434" v="900" actId="255"/>
+          <ac:chgData name="SIMON" userId="57eaa06a-09bc-4c31-91e8-c21407715321" providerId="ADAL" clId="{E0173219-27A4-4C2B-8E9F-5C3D7B7BFC25}" dt="2021-12-20T13:25:48.736" v="1315" actId="26606"/>
           <ac:spMkLst>
             <pc:docMk/>
             <pc:sldMk cId="2200142015" sldId="260"/>
             <ac:spMk id="3" creationId="{E55CC58B-8F3C-4F29-85E1-856AE58B4822}"/>
           </ac:spMkLst>
         </pc:spChg>
-        <pc:spChg chg="add">
-          <ac:chgData name="SIMON" userId="57eaa06a-09bc-4c31-91e8-c21407715321" providerId="ADAL" clId="{E0173219-27A4-4C2B-8E9F-5C3D7B7BFC25}" dt="2021-12-19T23:13:08.514" v="895" actId="26606"/>
+        <pc:spChg chg="add del">
+          <ac:chgData name="SIMON" userId="57eaa06a-09bc-4c31-91e8-c21407715321" providerId="ADAL" clId="{E0173219-27A4-4C2B-8E9F-5C3D7B7BFC25}" dt="2021-12-20T13:25:48.736" v="1315" actId="26606"/>
           <ac:spMkLst>
             <pc:docMk/>
             <pc:sldMk cId="2200142015" sldId="260"/>
             <ac:spMk id="9" creationId="{04812C46-200A-4DEB-A05E-3ED6C68C2387}"/>
           </ac:spMkLst>
         </pc:spChg>
-        <pc:spChg chg="add">
-          <ac:chgData name="SIMON" userId="57eaa06a-09bc-4c31-91e8-c21407715321" providerId="ADAL" clId="{E0173219-27A4-4C2B-8E9F-5C3D7B7BFC25}" dt="2021-12-19T23:13:08.514" v="895" actId="26606"/>
+        <pc:spChg chg="add del">
+          <ac:chgData name="SIMON" userId="57eaa06a-09bc-4c31-91e8-c21407715321" providerId="ADAL" clId="{E0173219-27A4-4C2B-8E9F-5C3D7B7BFC25}" dt="2021-12-20T13:25:48.736" v="1315" actId="26606"/>
           <ac:spMkLst>
             <pc:docMk/>
             <pc:sldMk cId="2200142015" sldId="260"/>
             <ac:spMk id="11" creationId="{D1EA859B-E555-4109-94F3-6700E046E008}"/>
           </ac:spMkLst>
         </pc:spChg>
-        <pc:picChg chg="add mod">
-          <ac:chgData name="SIMON" userId="57eaa06a-09bc-4c31-91e8-c21407715321" providerId="ADAL" clId="{E0173219-27A4-4C2B-8E9F-5C3D7B7BFC25}" dt="2021-12-19T23:13:59.524" v="902" actId="14100"/>
+        <pc:spChg chg="add del">
+          <ac:chgData name="SIMON" userId="57eaa06a-09bc-4c31-91e8-c21407715321" providerId="ADAL" clId="{E0173219-27A4-4C2B-8E9F-5C3D7B7BFC25}" dt="2021-12-20T13:25:48.736" v="1315" actId="26606"/>
+          <ac:spMkLst>
+            <pc:docMk/>
+            <pc:sldMk cId="2200142015" sldId="260"/>
+            <ac:spMk id="16" creationId="{F13C74B1-5B17-4795-BED0-7140497B445A}"/>
+          </ac:spMkLst>
+        </pc:spChg>
+        <pc:spChg chg="add del">
+          <ac:chgData name="SIMON" userId="57eaa06a-09bc-4c31-91e8-c21407715321" providerId="ADAL" clId="{E0173219-27A4-4C2B-8E9F-5C3D7B7BFC25}" dt="2021-12-20T13:25:48.736" v="1315" actId="26606"/>
+          <ac:spMkLst>
+            <pc:docMk/>
+            <pc:sldMk cId="2200142015" sldId="260"/>
+            <ac:spMk id="18" creationId="{D4974D33-8DC5-464E-8C6D-BE58F0669C17}"/>
+          </ac:spMkLst>
+        </pc:spChg>
+        <pc:picChg chg="add mod ord">
+          <ac:chgData name="SIMON" userId="57eaa06a-09bc-4c31-91e8-c21407715321" providerId="ADAL" clId="{E0173219-27A4-4C2B-8E9F-5C3D7B7BFC25}" dt="2021-12-20T13:25:48.736" v="1315" actId="26606"/>
           <ac:picMkLst>
             <pc:docMk/>
             <pc:sldMk cId="2200142015" sldId="260"/>
@@ -490,7 +522,7 @@
         </pc:picChg>
       </pc:sldChg>
       <pc:sldChg chg="addSp modSp new mod setBg">
-        <pc:chgData name="SIMON" userId="57eaa06a-09bc-4c31-91e8-c21407715321" providerId="ADAL" clId="{E0173219-27A4-4C2B-8E9F-5C3D7B7BFC25}" dt="2021-12-20T00:00:20.811" v="1238"/>
+        <pc:chgData name="SIMON" userId="57eaa06a-09bc-4c31-91e8-c21407715321" providerId="ADAL" clId="{E0173219-27A4-4C2B-8E9F-5C3D7B7BFC25}" dt="2021-12-20T13:45:53.217" v="1428"/>
         <pc:sldMkLst>
           <pc:docMk/>
           <pc:sldMk cId="4192907177" sldId="261"/>
@@ -504,7 +536,7 @@
           </ac:spMkLst>
         </pc:spChg>
         <pc:spChg chg="mod">
-          <ac:chgData name="SIMON" userId="57eaa06a-09bc-4c31-91e8-c21407715321" providerId="ADAL" clId="{E0173219-27A4-4C2B-8E9F-5C3D7B7BFC25}" dt="2021-12-19T23:59:42.102" v="1233" actId="207"/>
+          <ac:chgData name="SIMON" userId="57eaa06a-09bc-4c31-91e8-c21407715321" providerId="ADAL" clId="{E0173219-27A4-4C2B-8E9F-5C3D7B7BFC25}" dt="2021-12-20T11:26:34.352" v="1308" actId="20577"/>
           <ac:spMkLst>
             <pc:docMk/>
             <pc:sldMk cId="4192907177" sldId="261"/>
@@ -672,7 +704,7 @@
           <a:p>
             <a:fld id="{AEB829E3-F1EE-4D2F-8103-4EDBCF2E7312}" type="datetimeFigureOut">
               <a:rPr lang="fr-FR" smtClean="0"/>
-              <a:t>19/12/2021</a:t>
+              <a:t>20/12/2021</a:t>
             </a:fld>
             <a:endParaRPr lang="fr-FR"/>
           </a:p>
@@ -870,7 +902,7 @@
           <a:p>
             <a:fld id="{AEB829E3-F1EE-4D2F-8103-4EDBCF2E7312}" type="datetimeFigureOut">
               <a:rPr lang="fr-FR" smtClean="0"/>
-              <a:t>19/12/2021</a:t>
+              <a:t>20/12/2021</a:t>
             </a:fld>
             <a:endParaRPr lang="fr-FR"/>
           </a:p>
@@ -1078,7 +1110,7 @@
           <a:p>
             <a:fld id="{AEB829E3-F1EE-4D2F-8103-4EDBCF2E7312}" type="datetimeFigureOut">
               <a:rPr lang="fr-FR" smtClean="0"/>
-              <a:t>19/12/2021</a:t>
+              <a:t>20/12/2021</a:t>
             </a:fld>
             <a:endParaRPr lang="fr-FR"/>
           </a:p>
@@ -1276,7 +1308,7 @@
           <a:p>
             <a:fld id="{AEB829E3-F1EE-4D2F-8103-4EDBCF2E7312}" type="datetimeFigureOut">
               <a:rPr lang="fr-FR" smtClean="0"/>
-              <a:t>19/12/2021</a:t>
+              <a:t>20/12/2021</a:t>
             </a:fld>
             <a:endParaRPr lang="fr-FR"/>
           </a:p>
@@ -1551,7 +1583,7 @@
           <a:p>
             <a:fld id="{AEB829E3-F1EE-4D2F-8103-4EDBCF2E7312}" type="datetimeFigureOut">
               <a:rPr lang="fr-FR" smtClean="0"/>
-              <a:t>19/12/2021</a:t>
+              <a:t>20/12/2021</a:t>
             </a:fld>
             <a:endParaRPr lang="fr-FR"/>
           </a:p>
@@ -1816,7 +1848,7 @@
           <a:p>
             <a:fld id="{AEB829E3-F1EE-4D2F-8103-4EDBCF2E7312}" type="datetimeFigureOut">
               <a:rPr lang="fr-FR" smtClean="0"/>
-              <a:t>19/12/2021</a:t>
+              <a:t>20/12/2021</a:t>
             </a:fld>
             <a:endParaRPr lang="fr-FR"/>
           </a:p>
@@ -2228,7 +2260,7 @@
           <a:p>
             <a:fld id="{AEB829E3-F1EE-4D2F-8103-4EDBCF2E7312}" type="datetimeFigureOut">
               <a:rPr lang="fr-FR" smtClean="0"/>
-              <a:t>19/12/2021</a:t>
+              <a:t>20/12/2021</a:t>
             </a:fld>
             <a:endParaRPr lang="fr-FR"/>
           </a:p>
@@ -2369,7 +2401,7 @@
           <a:p>
             <a:fld id="{AEB829E3-F1EE-4D2F-8103-4EDBCF2E7312}" type="datetimeFigureOut">
               <a:rPr lang="fr-FR" smtClean="0"/>
-              <a:t>19/12/2021</a:t>
+              <a:t>20/12/2021</a:t>
             </a:fld>
             <a:endParaRPr lang="fr-FR"/>
           </a:p>
@@ -2482,7 +2514,7 @@
           <a:p>
             <a:fld id="{AEB829E3-F1EE-4D2F-8103-4EDBCF2E7312}" type="datetimeFigureOut">
               <a:rPr lang="fr-FR" smtClean="0"/>
-              <a:t>19/12/2021</a:t>
+              <a:t>20/12/2021</a:t>
             </a:fld>
             <a:endParaRPr lang="fr-FR"/>
           </a:p>
@@ -2793,7 +2825,7 @@
           <a:p>
             <a:fld id="{AEB829E3-F1EE-4D2F-8103-4EDBCF2E7312}" type="datetimeFigureOut">
               <a:rPr lang="fr-FR" smtClean="0"/>
-              <a:t>19/12/2021</a:t>
+              <a:t>20/12/2021</a:t>
             </a:fld>
             <a:endParaRPr lang="fr-FR"/>
           </a:p>
@@ -3081,7 +3113,7 @@
           <a:p>
             <a:fld id="{AEB829E3-F1EE-4D2F-8103-4EDBCF2E7312}" type="datetimeFigureOut">
               <a:rPr lang="fr-FR" smtClean="0"/>
-              <a:t>19/12/2021</a:t>
+              <a:t>20/12/2021</a:t>
             </a:fld>
             <a:endParaRPr lang="fr-FR"/>
           </a:p>
@@ -3322,7 +3354,7 @@
           <a:p>
             <a:fld id="{AEB829E3-F1EE-4D2F-8103-4EDBCF2E7312}" type="datetimeFigureOut">
               <a:rPr lang="fr-FR" smtClean="0"/>
-              <a:t>19/12/2021</a:t>
+              <a:t>20/12/2021</a:t>
             </a:fld>
             <a:endParaRPr lang="fr-FR"/>
           </a:p>
@@ -4363,71 +4395,6 @@
           </a:p>
           <a:p>
             <a:r>
-              <a:rPr lang="fr-FR" sz="2000" dirty="0">
-                <a:solidFill>
-                  <a:schemeClr val="bg1"/>
-                </a:solidFill>
-                <a:latin typeface="Franklin Gothic Book" panose="020B0503020102020204" pitchFamily="34" charset="0"/>
-              </a:rPr>
-              <a:t>Project </a:t>
-            </a:r>
-            <a:r>
-              <a:rPr lang="fr-FR" sz="2000" dirty="0" err="1">
-                <a:solidFill>
-                  <a:schemeClr val="bg1"/>
-                </a:solidFill>
-                <a:latin typeface="Franklin Gothic Book" panose="020B0503020102020204" pitchFamily="34" charset="0"/>
-              </a:rPr>
-              <a:t>based</a:t>
-            </a:r>
-            <a:r>
-              <a:rPr lang="fr-FR" sz="2000" dirty="0">
-                <a:solidFill>
-                  <a:schemeClr val="bg1"/>
-                </a:solidFill>
-                <a:latin typeface="Franklin Gothic Book" panose="020B0503020102020204" pitchFamily="34" charset="0"/>
-              </a:rPr>
-              <a:t>: simulation in a </a:t>
-            </a:r>
-            <a:r>
-              <a:rPr lang="fr-FR" sz="2000" dirty="0" err="1">
-                <a:solidFill>
-                  <a:schemeClr val="bg1"/>
-                </a:solidFill>
-                <a:latin typeface="Franklin Gothic Book" panose="020B0503020102020204" pitchFamily="34" charset="0"/>
-              </a:rPr>
-              <a:t>forest</a:t>
-            </a:r>
-            <a:r>
-              <a:rPr lang="fr-FR" sz="2000" dirty="0">
-                <a:solidFill>
-                  <a:schemeClr val="bg1"/>
-                </a:solidFill>
-                <a:latin typeface="Franklin Gothic Book" panose="020B0503020102020204" pitchFamily="34" charset="0"/>
-              </a:rPr>
-              <a:t> in the </a:t>
-            </a:r>
-            <a:r>
-              <a:rPr lang="fr-FR" sz="2000" dirty="0" err="1">
-                <a:solidFill>
-                  <a:schemeClr val="bg1"/>
-                </a:solidFill>
-                <a:latin typeface="Franklin Gothic Book" panose="020B0503020102020204" pitchFamily="34" charset="0"/>
-              </a:rPr>
-              <a:t>south</a:t>
-            </a:r>
-            <a:r>
-              <a:rPr lang="fr-FR" sz="2000" dirty="0">
-                <a:solidFill>
-                  <a:schemeClr val="bg1"/>
-                </a:solidFill>
-                <a:latin typeface="Franklin Gothic Book" panose="020B0503020102020204" pitchFamily="34" charset="0"/>
-              </a:rPr>
-              <a:t> of France.</a:t>
-            </a:r>
-          </a:p>
-          <a:p>
-            <a:r>
               <a:rPr lang="fr-FR" sz="2000" dirty="0" err="1">
                 <a:solidFill>
                   <a:schemeClr val="bg1"/>
@@ -4775,6 +4742,36 @@
           <a:xfrm>
             <a:off x="10846377" y="5872152"/>
             <a:ext cx="1014846" cy="620723"/>
+          </a:xfrm>
+          <a:prstGeom prst="rect">
+            <a:avLst/>
+          </a:prstGeom>
+        </p:spPr>
+      </p:pic>
+      <p:pic>
+        <p:nvPicPr>
+          <p:cNvPr id="6" name="Image 5">
+            <a:extLst>
+              <a:ext uri="{FF2B5EF4-FFF2-40B4-BE49-F238E27FC236}">
+                <a16:creationId xmlns:a16="http://schemas.microsoft.com/office/drawing/2014/main" id="{99D49BE6-8518-4B48-B263-3F123FE3C6DB}"/>
+              </a:ext>
+            </a:extLst>
+          </p:cNvPr>
+          <p:cNvPicPr>
+            <a:picLocks noChangeAspect="1"/>
+          </p:cNvPicPr>
+          <p:nvPr/>
+        </p:nvPicPr>
+        <p:blipFill>
+          <a:blip r:embed="rId3"/>
+          <a:stretch>
+            <a:fillRect/>
+          </a:stretch>
+        </p:blipFill>
+        <p:spPr>
+          <a:xfrm>
+            <a:off x="3990887" y="4306496"/>
+            <a:ext cx="3585662" cy="2186379"/>
           </a:xfrm>
           <a:prstGeom prst="rect">
             <a:avLst/>
@@ -5548,42 +5545,6 @@
           </a:p>
         </p:txBody>
       </p:sp>
-      <p:pic>
-        <p:nvPicPr>
-          <p:cNvPr id="5" name="Image 4">
-            <a:extLst>
-              <a:ext uri="{FF2B5EF4-FFF2-40B4-BE49-F238E27FC236}">
-                <a16:creationId xmlns:a16="http://schemas.microsoft.com/office/drawing/2014/main" id="{D7F50E20-D6A0-49C4-9D1C-50D09C74EA86}"/>
-              </a:ext>
-            </a:extLst>
-          </p:cNvPr>
-          <p:cNvPicPr>
-            <a:picLocks noChangeAspect="1"/>
-          </p:cNvPicPr>
-          <p:nvPr/>
-        </p:nvPicPr>
-        <p:blipFill>
-          <a:blip r:embed="rId2">
-            <a:extLst>
-              <a:ext uri="{28A0092B-C50C-407E-A947-70E740481C1C}">
-                <a14:useLocalDpi xmlns:a14="http://schemas.microsoft.com/office/drawing/2010/main" val="0"/>
-              </a:ext>
-            </a:extLst>
-          </a:blip>
-          <a:stretch>
-            <a:fillRect/>
-          </a:stretch>
-        </p:blipFill>
-        <p:spPr>
-          <a:xfrm>
-            <a:off x="1278292" y="1840041"/>
-            <a:ext cx="9140890" cy="4530702"/>
-          </a:xfrm>
-          <a:prstGeom prst="rect">
-            <a:avLst/>
-          </a:prstGeom>
-        </p:spPr>
-      </p:pic>
       <p:sp>
         <p:nvSpPr>
           <p:cNvPr id="7" name="Rectangle : coins arrondis 6">
@@ -5636,6 +5597,42 @@
           </a:p>
         </p:txBody>
       </p:sp>
+      <p:pic>
+        <p:nvPicPr>
+          <p:cNvPr id="4" name="Image 3">
+            <a:extLst>
+              <a:ext uri="{FF2B5EF4-FFF2-40B4-BE49-F238E27FC236}">
+                <a16:creationId xmlns:a16="http://schemas.microsoft.com/office/drawing/2014/main" id="{9B844152-376D-4222-9A2A-BD1B2A3A0814}"/>
+              </a:ext>
+            </a:extLst>
+          </p:cNvPr>
+          <p:cNvPicPr>
+            <a:picLocks noChangeAspect="1"/>
+          </p:cNvPicPr>
+          <p:nvPr/>
+        </p:nvPicPr>
+        <p:blipFill>
+          <a:blip r:embed="rId2">
+            <a:extLst>
+              <a:ext uri="{28A0092B-C50C-407E-A947-70E740481C1C}">
+                <a14:useLocalDpi xmlns:a14="http://schemas.microsoft.com/office/drawing/2010/main" val="0"/>
+              </a:ext>
+            </a:extLst>
+          </a:blip>
+          <a:stretch>
+            <a:fillRect/>
+          </a:stretch>
+        </p:blipFill>
+        <p:spPr>
+          <a:xfrm>
+            <a:off x="1209962" y="1686411"/>
+            <a:ext cx="9450844" cy="4684331"/>
+          </a:xfrm>
+          <a:prstGeom prst="rect">
+            <a:avLst/>
+          </a:prstGeom>
+        </p:spPr>
+      </p:pic>
     </p:spTree>
     <p:extLst>
       <p:ext uri="{BB962C8B-B14F-4D97-AF65-F5344CB8AC3E}">
@@ -5656,25 +5653,22 @@
       <p:bgPr>
         <a:gradFill>
           <a:gsLst>
-            <a:gs pos="0">
+            <a:gs pos="53000">
               <a:schemeClr val="tx1">
                 <a:lumMod val="65000"/>
                 <a:lumOff val="35000"/>
               </a:schemeClr>
             </a:gs>
-            <a:gs pos="45000">
+            <a:gs pos="83000">
               <a:schemeClr val="tx1">
                 <a:lumMod val="50000"/>
                 <a:lumOff val="50000"/>
               </a:schemeClr>
             </a:gs>
-            <a:gs pos="85000">
+            <a:gs pos="100000">
               <a:schemeClr val="bg2">
                 <a:lumMod val="75000"/>
               </a:schemeClr>
-            </a:gs>
-            <a:gs pos="100000">
-              <a:schemeClr val="bg2"/>
             </a:gs>
           </a:gsLst>
           <a:lin ang="5400000" scaled="1"/>
@@ -5943,6 +5937,56 @@
                 <a:latin typeface="Franklin Gothic Book" panose="020B0503020102020204" pitchFamily="34" charset="0"/>
               </a:rPr>
               <a:t>.</a:t>
+            </a:r>
+          </a:p>
+          <a:p>
+            <a:pPr marL="0" indent="0">
+              <a:buNone/>
+            </a:pPr>
+            <a:r>
+              <a:rPr lang="fr-FR" dirty="0">
+                <a:solidFill>
+                  <a:schemeClr val="bg1"/>
+                </a:solidFill>
+                <a:latin typeface="Franklin Gothic Book" panose="020B0503020102020204" pitchFamily="34" charset="0"/>
+              </a:rPr>
+              <a:t>(</a:t>
+            </a:r>
+            <a:r>
+              <a:rPr lang="fr-FR" dirty="0" err="1">
+                <a:solidFill>
+                  <a:schemeClr val="bg1"/>
+                </a:solidFill>
+                <a:latin typeface="Franklin Gothic Book" panose="020B0503020102020204" pitchFamily="34" charset="0"/>
+              </a:rPr>
+              <a:t>Firebase</a:t>
+            </a:r>
+            <a:r>
+              <a:rPr lang="fr-FR" dirty="0">
+                <a:solidFill>
+                  <a:schemeClr val="bg1"/>
+                </a:solidFill>
+                <a:latin typeface="Franklin Gothic Book" panose="020B0503020102020204" pitchFamily="34" charset="0"/>
+              </a:rPr>
+              <a:t>, API key, </a:t>
+            </a:r>
+            <a:r>
+              <a:rPr lang="fr-FR" dirty="0" err="1">
+                <a:solidFill>
+                  <a:schemeClr val="bg1"/>
+                </a:solidFill>
+                <a:latin typeface="Franklin Gothic Book" panose="020B0503020102020204" pitchFamily="34" charset="0"/>
+              </a:rPr>
+              <a:t>Maps</a:t>
+            </a:r>
+            <a:r>
+              <a:rPr lang="fr-FR" dirty="0">
+                <a:solidFill>
+                  <a:schemeClr val="bg1"/>
+                </a:solidFill>
+                <a:latin typeface="Franklin Gothic Book" panose="020B0503020102020204" pitchFamily="34" charset="0"/>
+              </a:rPr>
+              <a:t>, VS Code module…)</a:t>
             </a:r>
           </a:p>
           <a:p>
@@ -6265,57 +6309,45 @@
               <a:buNone/>
             </a:pPr>
             <a:r>
-              <a:rPr lang="fr-FR" sz="4400" dirty="0">
-                <a:solidFill>
-                  <a:schemeClr val="bg1"/>
-                </a:solidFill>
-                <a:latin typeface="Franklin Gothic Book" panose="020B0503020102020204" pitchFamily="34" charset="0"/>
-              </a:rPr>
-              <a:t>Let </a:t>
-            </a:r>
-            <a:r>
-              <a:rPr lang="fr-FR" sz="4400" dirty="0" err="1">
-                <a:solidFill>
-                  <a:schemeClr val="bg1"/>
-                </a:solidFill>
-                <a:latin typeface="Franklin Gothic Book" panose="020B0503020102020204" pitchFamily="34" charset="0"/>
-              </a:rPr>
-              <a:t>see</a:t>
-            </a:r>
-            <a:r>
-              <a:rPr lang="fr-FR" sz="4400" dirty="0">
-                <a:solidFill>
-                  <a:schemeClr val="bg1"/>
-                </a:solidFill>
-                <a:latin typeface="Franklin Gothic Book" panose="020B0503020102020204" pitchFamily="34" charset="0"/>
-              </a:rPr>
-              <a:t> the Web site</a:t>
+              <a:rPr lang="fr-FR" sz="4400">
+                <a:solidFill>
+                  <a:schemeClr val="bg1"/>
+                </a:solidFill>
+                <a:latin typeface="Franklin Gothic Book" panose="020B0503020102020204" pitchFamily="34" charset="0"/>
+              </a:rPr>
+              <a:t>Let see the Web site</a:t>
             </a:r>
           </a:p>
           <a:p>
             <a:pPr marL="0" indent="0" algn="ctr">
               <a:buNone/>
             </a:pPr>
+            <a:endParaRPr lang="fr-FR" sz="4400">
+              <a:solidFill>
+                <a:schemeClr val="bg1"/>
+              </a:solidFill>
+              <a:latin typeface="Franklin Gothic Book" panose="020B0503020102020204" pitchFamily="34" charset="0"/>
+            </a:endParaRPr>
+          </a:p>
+          <a:p>
+            <a:pPr marL="0" indent="0" algn="ctr">
+              <a:buNone/>
+            </a:pPr>
+            <a:r>
+              <a:rPr lang="fr-FR" sz="4400">
+                <a:solidFill>
+                  <a:schemeClr val="bg1"/>
+                </a:solidFill>
+                <a:latin typeface="Franklin Gothic Book" panose="020B0503020102020204" pitchFamily="34" charset="0"/>
+              </a:rPr>
+              <a:t>…</a:t>
+            </a:r>
             <a:endParaRPr lang="fr-FR" sz="4400" dirty="0">
               <a:solidFill>
                 <a:schemeClr val="bg1"/>
               </a:solidFill>
               <a:latin typeface="Franklin Gothic Book" panose="020B0503020102020204" pitchFamily="34" charset="0"/>
             </a:endParaRPr>
-          </a:p>
-          <a:p>
-            <a:pPr marL="0" indent="0" algn="ctr">
-              <a:buNone/>
-            </a:pPr>
-            <a:r>
-              <a:rPr lang="fr-FR" sz="4400" dirty="0">
-                <a:solidFill>
-                  <a:schemeClr val="bg1"/>
-                </a:solidFill>
-                <a:latin typeface="Franklin Gothic Book" panose="020B0503020102020204" pitchFamily="34" charset="0"/>
-              </a:rPr>
-              <a:t>…</a:t>
-            </a:r>
           </a:p>
         </p:txBody>
       </p:sp>

</xml_diff>